<commit_message>
Watch & Comouted & 生命週期函式補充
</commit_message>
<xml_diff>
--- a/Vue教育訓練.pptx
+++ b/Vue教育訓練.pptx
@@ -15,12 +15,6 @@
     <p:sldId id="264" r:id="rId9"/>
     <p:sldId id="265" r:id="rId10"/>
     <p:sldId id="266" r:id="rId11"/>
-    <p:sldId id="267" r:id="rId12"/>
-    <p:sldId id="271" r:id="rId13"/>
-    <p:sldId id="270" r:id="rId14"/>
-    <p:sldId id="269" r:id="rId15"/>
-    <p:sldId id="268" r:id="rId16"/>
-    <p:sldId id="272" r:id="rId17"/>
   </p:sldIdLst>
   <p:sldSz cx="12192000" cy="6858000"/>
   <p:notesSz cx="6858000" cy="9144000"/>
@@ -6139,7 +6133,7 @@
           <p:nvPr>
             <p:extLst>
               <p:ext uri="{D42A27DB-BD31-4B8C-83A1-F6EECF244321}">
-                <p14:modId xmlns:p14="http://schemas.microsoft.com/office/powerpoint/2010/main" val="618969057"/>
+                <p14:modId xmlns:p14="http://schemas.microsoft.com/office/powerpoint/2010/main" val="3022248130"/>
               </p:ext>
             </p:extLst>
           </p:nvPr>
@@ -6882,6 +6876,30 @@
                         <a:tabLst/>
                         <a:defRPr/>
                       </a:pPr>
+                      <a:r>
+                        <a:rPr lang="zh-TW" altLang="en-US" dirty="0" smtClean="0">
+                          <a:solidFill>
+                            <a:schemeClr val="tx1"/>
+                          </a:solidFill>
+                        </a:rPr>
+                        <a:t>取代</a:t>
+                      </a:r>
+                      <a:r>
+                        <a:rPr lang="en-US" altLang="zh-TW" dirty="0" smtClean="0">
+                          <a:solidFill>
+                            <a:schemeClr val="tx1"/>
+                          </a:solidFill>
+                        </a:rPr>
+                        <a:t>mounted</a:t>
+                      </a:r>
+                      <a:r>
+                        <a:rPr lang="zh-TW" altLang="en-US" dirty="0" smtClean="0">
+                          <a:solidFill>
+                            <a:schemeClr val="tx1"/>
+                          </a:solidFill>
+                        </a:rPr>
+                        <a:t>，在每次進入組件時呼叫</a:t>
+                      </a:r>
                       <a:endParaRPr lang="en-US" altLang="zh-TW" dirty="0">
                         <a:solidFill>
                           <a:schemeClr val="tx1"/>
@@ -6973,565 +6991,6 @@
     <p:extLst>
       <p:ext uri="{BB962C8B-B14F-4D97-AF65-F5344CB8AC3E}">
         <p14:creationId xmlns:p14="http://schemas.microsoft.com/office/powerpoint/2010/main" val="2506174950"/>
-      </p:ext>
-    </p:extLst>
-  </p:cSld>
-  <p:clrMapOvr>
-    <a:masterClrMapping/>
-  </p:clrMapOvr>
-</p:sld>
-</file>
-
-<file path=ppt/slides/slide11.xml><?xml version="1.0" encoding="utf-8"?>
-<p:sld xmlns:a="http://schemas.openxmlformats.org/drawingml/2006/main" xmlns:r="http://schemas.openxmlformats.org/officeDocument/2006/relationships" xmlns:p="http://schemas.openxmlformats.org/presentationml/2006/main">
-  <p:cSld>
-    <p:spTree>
-      <p:nvGrpSpPr>
-        <p:cNvPr id="1" name=""/>
-        <p:cNvGrpSpPr/>
-        <p:nvPr/>
-      </p:nvGrpSpPr>
-      <p:grpSpPr>
-        <a:xfrm>
-          <a:off x="0" y="0"/>
-          <a:ext cx="0" cy="0"/>
-          <a:chOff x="0" y="0"/>
-          <a:chExt cx="0" cy="0"/>
-        </a:xfrm>
-      </p:grpSpPr>
-      <p:sp>
-        <p:nvSpPr>
-          <p:cNvPr id="2" name="標題 1"/>
-          <p:cNvSpPr>
-            <a:spLocks noGrp="1"/>
-          </p:cNvSpPr>
-          <p:nvPr>
-            <p:ph type="title"/>
-          </p:nvPr>
-        </p:nvSpPr>
-        <p:spPr/>
-        <p:txBody>
-          <a:bodyPr/>
-          <a:lstStyle/>
-          <a:p>
-            <a:r>
-              <a:rPr lang="en-US" altLang="zh-TW" dirty="0" err="1"/>
-              <a:t>Vue-vue</a:t>
-            </a:r>
-            <a:r>
-              <a:rPr lang="zh-TW" altLang="en-US" dirty="0"/>
-              <a:t>組件</a:t>
-            </a:r>
-          </a:p>
-        </p:txBody>
-      </p:sp>
-      <p:sp>
-        <p:nvSpPr>
-          <p:cNvPr id="3" name="內容版面配置區 2"/>
-          <p:cNvSpPr>
-            <a:spLocks noGrp="1"/>
-          </p:cNvSpPr>
-          <p:nvPr>
-            <p:ph idx="1"/>
-          </p:nvPr>
-        </p:nvSpPr>
-        <p:spPr/>
-        <p:txBody>
-          <a:bodyPr/>
-          <a:lstStyle/>
-          <a:p>
-            <a:r>
-              <a:rPr lang="zh-TW" altLang="en-US" dirty="0"/>
-              <a:t>什麼是組件</a:t>
-            </a:r>
-            <a:r>
-              <a:rPr lang="en-US" altLang="zh-TW" dirty="0"/>
-              <a:t>?</a:t>
-            </a:r>
-            <a:endParaRPr lang="zh-TW" altLang="en-US" dirty="0"/>
-          </a:p>
-        </p:txBody>
-      </p:sp>
-    </p:spTree>
-    <p:extLst>
-      <p:ext uri="{BB962C8B-B14F-4D97-AF65-F5344CB8AC3E}">
-        <p14:creationId xmlns:p14="http://schemas.microsoft.com/office/powerpoint/2010/main" val="3752965375"/>
-      </p:ext>
-    </p:extLst>
-  </p:cSld>
-  <p:clrMapOvr>
-    <a:masterClrMapping/>
-  </p:clrMapOvr>
-</p:sld>
-</file>
-
-<file path=ppt/slides/slide12.xml><?xml version="1.0" encoding="utf-8"?>
-<p:sld xmlns:a="http://schemas.openxmlformats.org/drawingml/2006/main" xmlns:r="http://schemas.openxmlformats.org/officeDocument/2006/relationships" xmlns:p="http://schemas.openxmlformats.org/presentationml/2006/main">
-  <p:cSld>
-    <p:spTree>
-      <p:nvGrpSpPr>
-        <p:cNvPr id="1" name=""/>
-        <p:cNvGrpSpPr/>
-        <p:nvPr/>
-      </p:nvGrpSpPr>
-      <p:grpSpPr>
-        <a:xfrm>
-          <a:off x="0" y="0"/>
-          <a:ext cx="0" cy="0"/>
-          <a:chOff x="0" y="0"/>
-          <a:chExt cx="0" cy="0"/>
-        </a:xfrm>
-      </p:grpSpPr>
-      <p:sp>
-        <p:nvSpPr>
-          <p:cNvPr id="2" name="標題 1"/>
-          <p:cNvSpPr>
-            <a:spLocks noGrp="1"/>
-          </p:cNvSpPr>
-          <p:nvPr>
-            <p:ph type="title"/>
-          </p:nvPr>
-        </p:nvSpPr>
-        <p:spPr/>
-        <p:txBody>
-          <a:bodyPr/>
-          <a:lstStyle/>
-          <a:p>
-            <a:r>
-              <a:rPr lang="en-US" altLang="zh-TW" dirty="0" err="1"/>
-              <a:t>Vue</a:t>
-            </a:r>
-            <a:r>
-              <a:rPr lang="en-US" altLang="zh-TW" dirty="0"/>
-              <a:t>-slot</a:t>
-            </a:r>
-            <a:r>
-              <a:rPr lang="zh-TW" altLang="en-US" dirty="0"/>
-              <a:t>插槽</a:t>
-            </a:r>
-          </a:p>
-        </p:txBody>
-      </p:sp>
-      <p:sp>
-        <p:nvSpPr>
-          <p:cNvPr id="3" name="內容版面配置區 2"/>
-          <p:cNvSpPr>
-            <a:spLocks noGrp="1"/>
-          </p:cNvSpPr>
-          <p:nvPr>
-            <p:ph idx="1"/>
-          </p:nvPr>
-        </p:nvSpPr>
-        <p:spPr/>
-        <p:txBody>
-          <a:bodyPr/>
-          <a:lstStyle/>
-          <a:p>
-            <a:r>
-              <a:rPr lang="en-US" altLang="zh-TW" dirty="0"/>
-              <a:t>Single slot</a:t>
-            </a:r>
-          </a:p>
-          <a:p>
-            <a:r>
-              <a:rPr lang="en-US" altLang="zh-TW" dirty="0"/>
-              <a:t>Named slot</a:t>
-            </a:r>
-          </a:p>
-          <a:p>
-            <a:r>
-              <a:rPr lang="en-US" altLang="zh-TW" dirty="0"/>
-              <a:t>Scope slot</a:t>
-            </a:r>
-            <a:endParaRPr lang="zh-TW" altLang="en-US" dirty="0"/>
-          </a:p>
-        </p:txBody>
-      </p:sp>
-    </p:spTree>
-    <p:extLst>
-      <p:ext uri="{BB962C8B-B14F-4D97-AF65-F5344CB8AC3E}">
-        <p14:creationId xmlns:p14="http://schemas.microsoft.com/office/powerpoint/2010/main" val="1287891098"/>
-      </p:ext>
-    </p:extLst>
-  </p:cSld>
-  <p:clrMapOvr>
-    <a:masterClrMapping/>
-  </p:clrMapOvr>
-</p:sld>
-</file>
-
-<file path=ppt/slides/slide13.xml><?xml version="1.0" encoding="utf-8"?>
-<p:sld xmlns:a="http://schemas.openxmlformats.org/drawingml/2006/main" xmlns:r="http://schemas.openxmlformats.org/officeDocument/2006/relationships" xmlns:p="http://schemas.openxmlformats.org/presentationml/2006/main">
-  <p:cSld>
-    <p:spTree>
-      <p:nvGrpSpPr>
-        <p:cNvPr id="1" name=""/>
-        <p:cNvGrpSpPr/>
-        <p:nvPr/>
-      </p:nvGrpSpPr>
-      <p:grpSpPr>
-        <a:xfrm>
-          <a:off x="0" y="0"/>
-          <a:ext cx="0" cy="0"/>
-          <a:chOff x="0" y="0"/>
-          <a:chExt cx="0" cy="0"/>
-        </a:xfrm>
-      </p:grpSpPr>
-      <p:sp>
-        <p:nvSpPr>
-          <p:cNvPr id="2" name="標題 1"/>
-          <p:cNvSpPr>
-            <a:spLocks noGrp="1"/>
-          </p:cNvSpPr>
-          <p:nvPr>
-            <p:ph type="title"/>
-          </p:nvPr>
-        </p:nvSpPr>
-        <p:spPr/>
-        <p:txBody>
-          <a:bodyPr/>
-          <a:lstStyle/>
-          <a:p>
-            <a:r>
-              <a:rPr lang="en-US" altLang="zh-TW" dirty="0" err="1"/>
-              <a:t>Vue-vue</a:t>
-            </a:r>
-            <a:r>
-              <a:rPr lang="en-US" altLang="zh-TW" dirty="0"/>
-              <a:t> cli </a:t>
-            </a:r>
-            <a:r>
-              <a:rPr lang="zh-TW" altLang="en-US" dirty="0"/>
-              <a:t>單一組件</a:t>
-            </a:r>
-          </a:p>
-        </p:txBody>
-      </p:sp>
-      <p:sp>
-        <p:nvSpPr>
-          <p:cNvPr id="3" name="內容版面配置區 2"/>
-          <p:cNvSpPr>
-            <a:spLocks noGrp="1"/>
-          </p:cNvSpPr>
-          <p:nvPr>
-            <p:ph idx="1"/>
-          </p:nvPr>
-        </p:nvSpPr>
-        <p:spPr/>
-        <p:txBody>
-          <a:bodyPr/>
-          <a:lstStyle/>
-          <a:p>
-            <a:r>
-              <a:rPr lang="en-US" altLang="zh-TW" dirty="0"/>
-              <a:t>Template</a:t>
-            </a:r>
-          </a:p>
-          <a:p>
-            <a:r>
-              <a:rPr lang="en-US" altLang="zh-TW" dirty="0"/>
-              <a:t>Script</a:t>
-            </a:r>
-          </a:p>
-          <a:p>
-            <a:r>
-              <a:rPr lang="en-US" altLang="zh-TW" dirty="0"/>
-              <a:t>Style</a:t>
-            </a:r>
-          </a:p>
-          <a:p>
-            <a:endParaRPr lang="zh-TW" altLang="en-US" dirty="0"/>
-          </a:p>
-        </p:txBody>
-      </p:sp>
-    </p:spTree>
-    <p:extLst>
-      <p:ext uri="{BB962C8B-B14F-4D97-AF65-F5344CB8AC3E}">
-        <p14:creationId xmlns:p14="http://schemas.microsoft.com/office/powerpoint/2010/main" val="1876279659"/>
-      </p:ext>
-    </p:extLst>
-  </p:cSld>
-  <p:clrMapOvr>
-    <a:masterClrMapping/>
-  </p:clrMapOvr>
-</p:sld>
-</file>
-
-<file path=ppt/slides/slide14.xml><?xml version="1.0" encoding="utf-8"?>
-<p:sld xmlns:a="http://schemas.openxmlformats.org/drawingml/2006/main" xmlns:r="http://schemas.openxmlformats.org/officeDocument/2006/relationships" xmlns:p="http://schemas.openxmlformats.org/presentationml/2006/main">
-  <p:cSld>
-    <p:spTree>
-      <p:nvGrpSpPr>
-        <p:cNvPr id="1" name=""/>
-        <p:cNvGrpSpPr/>
-        <p:nvPr/>
-      </p:nvGrpSpPr>
-      <p:grpSpPr>
-        <a:xfrm>
-          <a:off x="0" y="0"/>
-          <a:ext cx="0" cy="0"/>
-          <a:chOff x="0" y="0"/>
-          <a:chExt cx="0" cy="0"/>
-        </a:xfrm>
-      </p:grpSpPr>
-      <p:sp>
-        <p:nvSpPr>
-          <p:cNvPr id="2" name="標題 1"/>
-          <p:cNvSpPr>
-            <a:spLocks noGrp="1"/>
-          </p:cNvSpPr>
-          <p:nvPr>
-            <p:ph type="title"/>
-          </p:nvPr>
-        </p:nvSpPr>
-        <p:spPr/>
-        <p:txBody>
-          <a:bodyPr/>
-          <a:lstStyle/>
-          <a:p>
-            <a:r>
-              <a:rPr lang="en-US" altLang="zh-TW" dirty="0" err="1"/>
-              <a:t>Vue-vue</a:t>
-            </a:r>
-            <a:r>
-              <a:rPr lang="en-US" altLang="zh-TW" dirty="0"/>
-              <a:t> router</a:t>
-            </a:r>
-            <a:endParaRPr lang="zh-TW" altLang="en-US" dirty="0"/>
-          </a:p>
-        </p:txBody>
-      </p:sp>
-      <p:sp>
-        <p:nvSpPr>
-          <p:cNvPr id="3" name="內容版面配置區 2"/>
-          <p:cNvSpPr>
-            <a:spLocks noGrp="1"/>
-          </p:cNvSpPr>
-          <p:nvPr>
-            <p:ph idx="1"/>
-          </p:nvPr>
-        </p:nvSpPr>
-        <p:spPr/>
-        <p:txBody>
-          <a:bodyPr/>
-          <a:lstStyle/>
-          <a:p>
-            <a:r>
-              <a:rPr lang="en-US" altLang="zh-TW" dirty="0"/>
-              <a:t>v-router</a:t>
-            </a:r>
-          </a:p>
-          <a:p>
-            <a:r>
-              <a:rPr lang="en-US" altLang="zh-TW" dirty="0"/>
-              <a:t>Router-link</a:t>
-            </a:r>
-          </a:p>
-          <a:p>
-            <a:r>
-              <a:rPr lang="en-US" altLang="zh-TW" dirty="0"/>
-              <a:t>Router-view</a:t>
-            </a:r>
-            <a:endParaRPr lang="zh-TW" altLang="en-US" dirty="0"/>
-          </a:p>
-        </p:txBody>
-      </p:sp>
-    </p:spTree>
-    <p:extLst>
-      <p:ext uri="{BB962C8B-B14F-4D97-AF65-F5344CB8AC3E}">
-        <p14:creationId xmlns:p14="http://schemas.microsoft.com/office/powerpoint/2010/main" val="582048536"/>
-      </p:ext>
-    </p:extLst>
-  </p:cSld>
-  <p:clrMapOvr>
-    <a:masterClrMapping/>
-  </p:clrMapOvr>
-</p:sld>
-</file>
-
-<file path=ppt/slides/slide15.xml><?xml version="1.0" encoding="utf-8"?>
-<p:sld xmlns:a="http://schemas.openxmlformats.org/drawingml/2006/main" xmlns:r="http://schemas.openxmlformats.org/officeDocument/2006/relationships" xmlns:p="http://schemas.openxmlformats.org/presentationml/2006/main">
-  <p:cSld>
-    <p:spTree>
-      <p:nvGrpSpPr>
-        <p:cNvPr id="1" name=""/>
-        <p:cNvGrpSpPr/>
-        <p:nvPr/>
-      </p:nvGrpSpPr>
-      <p:grpSpPr>
-        <a:xfrm>
-          <a:off x="0" y="0"/>
-          <a:ext cx="0" cy="0"/>
-          <a:chOff x="0" y="0"/>
-          <a:chExt cx="0" cy="0"/>
-        </a:xfrm>
-      </p:grpSpPr>
-      <p:sp>
-        <p:nvSpPr>
-          <p:cNvPr id="2" name="標題 1"/>
-          <p:cNvSpPr>
-            <a:spLocks noGrp="1"/>
-          </p:cNvSpPr>
-          <p:nvPr>
-            <p:ph type="title"/>
-          </p:nvPr>
-        </p:nvSpPr>
-        <p:spPr/>
-        <p:txBody>
-          <a:bodyPr/>
-          <a:lstStyle/>
-          <a:p>
-            <a:r>
-              <a:rPr lang="en-US" altLang="zh-TW" dirty="0" err="1"/>
-              <a:t>Vue</a:t>
-            </a:r>
-            <a:r>
-              <a:rPr lang="en-US" altLang="zh-TW" dirty="0"/>
-              <a:t>-</a:t>
-            </a:r>
-            <a:r>
-              <a:rPr lang="zh-TW" altLang="en-US" dirty="0"/>
-              <a:t>狀態管理的</a:t>
-            </a:r>
-            <a:r>
-              <a:rPr lang="en-US" altLang="zh-TW" dirty="0" err="1"/>
-              <a:t>vuex</a:t>
-            </a:r>
-            <a:endParaRPr lang="zh-TW" altLang="en-US" dirty="0"/>
-          </a:p>
-        </p:txBody>
-      </p:sp>
-      <p:sp>
-        <p:nvSpPr>
-          <p:cNvPr id="3" name="內容版面配置區 2"/>
-          <p:cNvSpPr>
-            <a:spLocks noGrp="1"/>
-          </p:cNvSpPr>
-          <p:nvPr>
-            <p:ph idx="1"/>
-          </p:nvPr>
-        </p:nvSpPr>
-        <p:spPr/>
-        <p:txBody>
-          <a:bodyPr/>
-          <a:lstStyle/>
-          <a:p>
-            <a:r>
-              <a:rPr lang="en-US" altLang="zh-TW" dirty="0"/>
-              <a:t>Store</a:t>
-            </a:r>
-          </a:p>
-          <a:p>
-            <a:r>
-              <a:rPr lang="en-US" altLang="zh-TW" dirty="0"/>
-              <a:t>Getter</a:t>
-            </a:r>
-          </a:p>
-          <a:p>
-            <a:r>
-              <a:rPr lang="en-US" altLang="zh-TW" dirty="0"/>
-              <a:t>Mutation</a:t>
-            </a:r>
-          </a:p>
-          <a:p>
-            <a:r>
-              <a:rPr lang="en-US" altLang="zh-TW" dirty="0"/>
-              <a:t>Actions</a:t>
-            </a:r>
-          </a:p>
-          <a:p>
-            <a:r>
-              <a:rPr lang="en-US" altLang="zh-TW" dirty="0"/>
-              <a:t>Module</a:t>
-            </a:r>
-          </a:p>
-          <a:p>
-            <a:pPr marL="0" indent="0">
-              <a:buNone/>
-            </a:pPr>
-            <a:endParaRPr lang="zh-TW" altLang="en-US" dirty="0"/>
-          </a:p>
-        </p:txBody>
-      </p:sp>
-    </p:spTree>
-    <p:extLst>
-      <p:ext uri="{BB962C8B-B14F-4D97-AF65-F5344CB8AC3E}">
-        <p14:creationId xmlns:p14="http://schemas.microsoft.com/office/powerpoint/2010/main" val="2857891251"/>
-      </p:ext>
-    </p:extLst>
-  </p:cSld>
-  <p:clrMapOvr>
-    <a:masterClrMapping/>
-  </p:clrMapOvr>
-</p:sld>
-</file>
-
-<file path=ppt/slides/slide16.xml><?xml version="1.0" encoding="utf-8"?>
-<p:sld xmlns:a="http://schemas.openxmlformats.org/drawingml/2006/main" xmlns:r="http://schemas.openxmlformats.org/officeDocument/2006/relationships" xmlns:p="http://schemas.openxmlformats.org/presentationml/2006/main">
-  <p:cSld>
-    <p:spTree>
-      <p:nvGrpSpPr>
-        <p:cNvPr id="1" name=""/>
-        <p:cNvGrpSpPr/>
-        <p:nvPr/>
-      </p:nvGrpSpPr>
-      <p:grpSpPr>
-        <a:xfrm>
-          <a:off x="0" y="0"/>
-          <a:ext cx="0" cy="0"/>
-          <a:chOff x="0" y="0"/>
-          <a:chExt cx="0" cy="0"/>
-        </a:xfrm>
-      </p:grpSpPr>
-      <p:sp>
-        <p:nvSpPr>
-          <p:cNvPr id="2" name="標題 1"/>
-          <p:cNvSpPr>
-            <a:spLocks noGrp="1"/>
-          </p:cNvSpPr>
-          <p:nvPr>
-            <p:ph type="title"/>
-          </p:nvPr>
-        </p:nvSpPr>
-        <p:spPr/>
-        <p:txBody>
-          <a:bodyPr/>
-          <a:lstStyle/>
-          <a:p>
-            <a:r>
-              <a:rPr lang="en-US" altLang="zh-TW" dirty="0" err="1"/>
-              <a:t>Vue-vue</a:t>
-            </a:r>
-            <a:r>
-              <a:rPr lang="zh-TW" altLang="en-US" dirty="0"/>
-              <a:t>的過渡效果</a:t>
-            </a:r>
-          </a:p>
-        </p:txBody>
-      </p:sp>
-      <p:sp>
-        <p:nvSpPr>
-          <p:cNvPr id="3" name="內容版面配置區 2"/>
-          <p:cNvSpPr>
-            <a:spLocks noGrp="1"/>
-          </p:cNvSpPr>
-          <p:nvPr>
-            <p:ph idx="1"/>
-          </p:nvPr>
-        </p:nvSpPr>
-        <p:spPr/>
-        <p:txBody>
-          <a:bodyPr/>
-          <a:lstStyle/>
-          <a:p>
-            <a:endParaRPr lang="zh-TW" altLang="en-US" dirty="0"/>
-          </a:p>
-        </p:txBody>
-      </p:sp>
-    </p:spTree>
-    <p:extLst>
-      <p:ext uri="{BB962C8B-B14F-4D97-AF65-F5344CB8AC3E}">
-        <p14:creationId xmlns:p14="http://schemas.microsoft.com/office/powerpoint/2010/main" val="2301204102"/>
       </p:ext>
     </p:extLst>
   </p:cSld>
@@ -10511,74 +9970,204 @@
             <p:ph idx="1"/>
           </p:nvPr>
         </p:nvSpPr>
-        <p:spPr/>
-        <p:txBody>
-          <a:bodyPr/>
+        <p:spPr>
+          <a:xfrm>
+            <a:off x="677334" y="1542810"/>
+            <a:ext cx="5846558" cy="2244356"/>
+          </a:xfrm>
+        </p:spPr>
+        <p:txBody>
+          <a:bodyPr>
+            <a:normAutofit/>
+          </a:bodyPr>
           <a:lstStyle/>
           <a:p>
             <a:r>
-              <a:rPr lang="zh-TW" altLang="en-US" dirty="0"/>
-              <a:t>語法</a:t>
-            </a:r>
-            <a:endParaRPr lang="en-US" altLang="zh-TW" dirty="0"/>
-          </a:p>
-          <a:p>
-            <a:endParaRPr lang="en-US" altLang="zh-TW" dirty="0"/>
-          </a:p>
-          <a:p>
-            <a:endParaRPr lang="en-US" altLang="zh-TW" dirty="0"/>
-          </a:p>
-          <a:p>
-            <a:endParaRPr lang="en-US" altLang="zh-TW" dirty="0"/>
-          </a:p>
-          <a:p>
-            <a:endParaRPr lang="en-US" altLang="zh-TW" dirty="0"/>
-          </a:p>
-          <a:p>
-            <a:pPr marL="0" indent="0">
-              <a:buNone/>
-            </a:pPr>
-            <a:r>
-              <a:rPr lang="en-US" altLang="zh-TW" dirty="0"/>
-              <a:t>=&gt;</a:t>
-            </a:r>
-            <a:r>
-              <a:rPr lang="zh-TW" altLang="en-US" dirty="0"/>
-              <a:t> 在</a:t>
-            </a:r>
-            <a:r>
-              <a:rPr lang="en-US" altLang="zh-TW" dirty="0"/>
+              <a:rPr lang="zh-TW" altLang="en-US" dirty="0" smtClean="0"/>
+              <a:t>在</a:t>
+            </a:r>
+            <a:r>
+              <a:rPr lang="en-US" altLang="zh-TW" dirty="0" smtClean="0"/>
               <a:t>computed</a:t>
             </a:r>
             <a:r>
-              <a:rPr lang="zh-TW" altLang="en-US" dirty="0"/>
-              <a:t>物件中，宣告一個函式或是物件，並且</a:t>
-            </a:r>
-            <a:r>
-              <a:rPr lang="en-US" altLang="zh-TW" dirty="0"/>
+              <a:rPr lang="zh-TW" altLang="en-US" dirty="0" smtClean="0"/>
+              <a:t>中宣告，</a:t>
+            </a:r>
+            <a:r>
+              <a:rPr lang="zh-TW" altLang="en-US" dirty="0" smtClean="0">
+                <a:solidFill>
+                  <a:srgbClr val="FF0000"/>
+                </a:solidFill>
+              </a:rPr>
+              <a:t>不可與</a:t>
+            </a:r>
+            <a:r>
+              <a:rPr lang="en-US" altLang="zh-TW" dirty="0" smtClean="0">
+                <a:solidFill>
+                  <a:srgbClr val="FF0000"/>
+                </a:solidFill>
+              </a:rPr>
+              <a:t>data</a:t>
+            </a:r>
+            <a:r>
+              <a:rPr lang="zh-TW" altLang="en-US" dirty="0" smtClean="0">
+                <a:solidFill>
+                  <a:srgbClr val="FF0000"/>
+                </a:solidFill>
+              </a:rPr>
+              <a:t>中的變數撞名</a:t>
+            </a:r>
+            <a:endParaRPr lang="en-US" altLang="zh-TW" dirty="0" smtClean="0">
+              <a:solidFill>
+                <a:srgbClr val="FF0000"/>
+              </a:solidFill>
+            </a:endParaRPr>
+          </a:p>
+          <a:p>
+            <a:r>
+              <a:rPr lang="zh-TW" altLang="en-US" dirty="0" smtClean="0">
+                <a:solidFill>
+                  <a:schemeClr val="tx1"/>
+                </a:solidFill>
+              </a:rPr>
+              <a:t>可以宣告成函式或</a:t>
+            </a:r>
+            <a:r>
+              <a:rPr lang="zh-TW" altLang="en-US" dirty="0">
+                <a:solidFill>
+                  <a:schemeClr val="tx1"/>
+                </a:solidFill>
+              </a:rPr>
+              <a:t>是</a:t>
+            </a:r>
+            <a:r>
+              <a:rPr lang="zh-TW" altLang="en-US" dirty="0" smtClean="0">
+                <a:solidFill>
+                  <a:schemeClr val="tx1"/>
+                </a:solidFill>
+              </a:rPr>
+              <a:t>物件，函式中一定要寫</a:t>
+            </a:r>
+            <a:r>
+              <a:rPr lang="en-US" altLang="zh-TW" dirty="0" smtClean="0">
+                <a:solidFill>
+                  <a:srgbClr val="FF0000"/>
+                </a:solidFill>
+              </a:rPr>
               <a:t>return</a:t>
             </a:r>
-            <a:r>
-              <a:rPr lang="zh-TW" altLang="en-US" dirty="0"/>
-              <a:t>一個經過計算處理後的值，只要函式內的其中一個數值發生改變，值就會重新計算，並</a:t>
-            </a:r>
-            <a:r>
-              <a:rPr lang="en-US" altLang="zh-TW" dirty="0"/>
-              <a:t>return</a:t>
-            </a:r>
-            <a:endParaRPr lang="zh-TW" altLang="en-US" dirty="0"/>
-          </a:p>
-          <a:p>
-            <a:pPr marL="0" indent="0">
-              <a:buNone/>
-            </a:pPr>
-            <a:endParaRPr lang="zh-TW" altLang="en-US" u="sng" dirty="0"/>
+          </a:p>
+          <a:p>
+            <a:r>
+              <a:rPr lang="zh-TW" altLang="en-US" dirty="0" smtClean="0">
+                <a:solidFill>
+                  <a:schemeClr val="tx1"/>
+                </a:solidFill>
+              </a:rPr>
+              <a:t>寫成物件，會有</a:t>
+            </a:r>
+            <a:r>
+              <a:rPr lang="en-US" altLang="zh-TW" dirty="0" smtClean="0">
+                <a:solidFill>
+                  <a:schemeClr val="tx1"/>
+                </a:solidFill>
+              </a:rPr>
+              <a:t>2</a:t>
+            </a:r>
+            <a:r>
+              <a:rPr lang="zh-TW" altLang="en-US" dirty="0" smtClean="0">
+                <a:solidFill>
+                  <a:schemeClr val="tx1"/>
+                </a:solidFill>
+              </a:rPr>
+              <a:t>個函式</a:t>
+            </a:r>
+            <a:r>
+              <a:rPr lang="en-US" altLang="zh-TW" dirty="0">
+                <a:solidFill>
+                  <a:schemeClr val="tx1"/>
+                </a:solidFill>
+              </a:rPr>
+              <a:t>:</a:t>
+            </a:r>
+            <a:r>
+              <a:rPr lang="en-US" altLang="zh-TW" dirty="0" smtClean="0">
+                <a:solidFill>
+                  <a:schemeClr val="tx1"/>
+                </a:solidFill>
+              </a:rPr>
+              <a:t>get()</a:t>
+            </a:r>
+            <a:r>
+              <a:rPr lang="zh-TW" altLang="en-US" dirty="0" smtClean="0">
+                <a:solidFill>
+                  <a:schemeClr val="tx1"/>
+                </a:solidFill>
+              </a:rPr>
+              <a:t>與</a:t>
+            </a:r>
+            <a:r>
+              <a:rPr lang="en-US" altLang="zh-TW" dirty="0" smtClean="0">
+                <a:solidFill>
+                  <a:schemeClr val="tx1"/>
+                </a:solidFill>
+              </a:rPr>
+              <a:t>set()</a:t>
+            </a:r>
+            <a:endParaRPr lang="en-US" altLang="zh-TW" dirty="0">
+              <a:solidFill>
+                <a:schemeClr val="tx1"/>
+              </a:solidFill>
+            </a:endParaRPr>
+          </a:p>
+          <a:p>
+            <a:r>
+              <a:rPr lang="zh-TW" altLang="en-US" dirty="0" smtClean="0">
+                <a:solidFill>
+                  <a:schemeClr val="tx1"/>
+                </a:solidFill>
+              </a:rPr>
+              <a:t>宣告函式，預設只會有</a:t>
+            </a:r>
+            <a:r>
+              <a:rPr lang="en-US" altLang="zh-TW" dirty="0" smtClean="0">
+                <a:solidFill>
+                  <a:schemeClr val="tx1"/>
+                </a:solidFill>
+              </a:rPr>
+              <a:t>get()</a:t>
+            </a:r>
+            <a:r>
+              <a:rPr lang="zh-TW" altLang="en-US" dirty="0" smtClean="0">
+                <a:solidFill>
+                  <a:schemeClr val="tx1"/>
+                </a:solidFill>
+              </a:rPr>
+              <a:t>狀態</a:t>
+            </a:r>
+            <a:endParaRPr lang="en-US" altLang="zh-TW" dirty="0" smtClean="0">
+              <a:solidFill>
+                <a:schemeClr val="tx1"/>
+              </a:solidFill>
+            </a:endParaRPr>
+          </a:p>
+          <a:p>
+            <a:r>
+              <a:rPr lang="en-US" altLang="zh-TW" dirty="0" smtClean="0"/>
+              <a:t>Set()</a:t>
+            </a:r>
+            <a:r>
+              <a:rPr lang="zh-TW" altLang="en-US" dirty="0" smtClean="0"/>
+              <a:t>函式必須帶一個參數</a:t>
+            </a:r>
+            <a:endParaRPr lang="en-US" altLang="zh-TW" dirty="0" smtClean="0"/>
           </a:p>
         </p:txBody>
       </p:sp>
       <p:pic>
         <p:nvPicPr>
-          <p:cNvPr id="4" name="圖片 3"/>
+          <p:cNvPr id="5" name="圖片 4"/>
           <p:cNvPicPr>
             <a:picLocks noChangeAspect="1"/>
           </p:cNvPicPr>
@@ -10598,14 +10187,163 @@
         </p:blipFill>
         <p:spPr>
           <a:xfrm>
-            <a:off x="782842" y="2545373"/>
-            <a:ext cx="4515371" cy="1367204"/>
+            <a:off x="7149927" y="1509959"/>
+            <a:ext cx="4248150" cy="5172075"/>
           </a:xfrm>
           <a:prstGeom prst="rect">
             <a:avLst/>
           </a:prstGeom>
         </p:spPr>
       </p:pic>
+      <p:graphicFrame>
+        <p:nvGraphicFramePr>
+          <p:cNvPr id="6" name="表格 5"/>
+          <p:cNvGraphicFramePr>
+            <a:graphicFrameLocks noGrp="1"/>
+          </p:cNvGraphicFramePr>
+          <p:nvPr>
+            <p:extLst>
+              <p:ext uri="{D42A27DB-BD31-4B8C-83A1-F6EECF244321}">
+                <p14:modId xmlns:p14="http://schemas.microsoft.com/office/powerpoint/2010/main" val="146004266"/>
+              </p:ext>
+            </p:extLst>
+          </p:nvPr>
+        </p:nvGraphicFramePr>
+        <p:xfrm>
+          <a:off x="801076" y="4491566"/>
+          <a:ext cx="5722816" cy="1112520"/>
+        </p:xfrm>
+        <a:graphic>
+          <a:graphicData uri="http://schemas.openxmlformats.org/drawingml/2006/table">
+            <a:tbl>
+              <a:tblPr firstRow="1" bandRow="1">
+                <a:tableStyleId>{5C22544A-7EE6-4342-B048-85BDC9FD1C3A}</a:tableStyleId>
+              </a:tblPr>
+              <a:tblGrid>
+                <a:gridCol w="2861408">
+                  <a:extLst>
+                    <a:ext uri="{9D8B030D-6E8A-4147-A177-3AD203B41FA5}">
+                      <a16:colId xmlns:a16="http://schemas.microsoft.com/office/drawing/2014/main" val="1132398457"/>
+                    </a:ext>
+                  </a:extLst>
+                </a:gridCol>
+                <a:gridCol w="2861408">
+                  <a:extLst>
+                    <a:ext uri="{9D8B030D-6E8A-4147-A177-3AD203B41FA5}">
+                      <a16:colId xmlns:a16="http://schemas.microsoft.com/office/drawing/2014/main" val="1264642311"/>
+                    </a:ext>
+                  </a:extLst>
+                </a:gridCol>
+              </a:tblGrid>
+              <a:tr h="370840">
+                <a:tc>
+                  <a:txBody>
+                    <a:bodyPr/>
+                    <a:lstStyle/>
+                    <a:p>
+                      <a:r>
+                        <a:rPr lang="zh-TW" altLang="en-US" dirty="0" smtClean="0"/>
+                        <a:t>函式</a:t>
+                      </a:r>
+                      <a:endParaRPr lang="zh-TW" altLang="en-US" dirty="0"/>
+                    </a:p>
+                  </a:txBody>
+                  <a:tcPr/>
+                </a:tc>
+                <a:tc>
+                  <a:txBody>
+                    <a:bodyPr/>
+                    <a:lstStyle/>
+                    <a:p>
+                      <a:r>
+                        <a:rPr lang="zh-TW" altLang="en-US" dirty="0" smtClean="0"/>
+                        <a:t>觸發時機</a:t>
+                      </a:r>
+                      <a:endParaRPr lang="zh-TW" altLang="en-US" dirty="0"/>
+                    </a:p>
+                  </a:txBody>
+                  <a:tcPr/>
+                </a:tc>
+                <a:extLst>
+                  <a:ext uri="{0D108BD9-81ED-4DB2-BD59-A6C34878D82A}">
+                    <a16:rowId xmlns:a16="http://schemas.microsoft.com/office/drawing/2014/main" val="412882910"/>
+                  </a:ext>
+                </a:extLst>
+              </a:tr>
+              <a:tr h="370840">
+                <a:tc>
+                  <a:txBody>
+                    <a:bodyPr/>
+                    <a:lstStyle/>
+                    <a:p>
+                      <a:r>
+                        <a:rPr lang="en-US" altLang="zh-TW" dirty="0" smtClean="0"/>
+                        <a:t>Get</a:t>
+                      </a:r>
+                      <a:endParaRPr lang="zh-TW" altLang="en-US" dirty="0"/>
+                    </a:p>
+                  </a:txBody>
+                  <a:tcPr/>
+                </a:tc>
+                <a:tc>
+                  <a:txBody>
+                    <a:bodyPr/>
+                    <a:lstStyle/>
+                    <a:p>
+                      <a:r>
+                        <a:rPr lang="zh-TW" altLang="en-US" dirty="0" smtClean="0"/>
+                        <a:t>函式或物件內資料改變</a:t>
+                      </a:r>
+                      <a:endParaRPr lang="zh-TW" altLang="en-US" dirty="0"/>
+                    </a:p>
+                  </a:txBody>
+                  <a:tcPr/>
+                </a:tc>
+                <a:extLst>
+                  <a:ext uri="{0D108BD9-81ED-4DB2-BD59-A6C34878D82A}">
+                    <a16:rowId xmlns:a16="http://schemas.microsoft.com/office/drawing/2014/main" val="1839548950"/>
+                  </a:ext>
+                </a:extLst>
+              </a:tr>
+              <a:tr h="370840">
+                <a:tc>
+                  <a:txBody>
+                    <a:bodyPr/>
+                    <a:lstStyle/>
+                    <a:p>
+                      <a:r>
+                        <a:rPr lang="en-US" altLang="zh-TW" dirty="0" smtClean="0"/>
+                        <a:t>Set</a:t>
+                      </a:r>
+                      <a:endParaRPr lang="zh-TW" altLang="en-US" dirty="0"/>
+                    </a:p>
+                  </a:txBody>
+                  <a:tcPr/>
+                </a:tc>
+                <a:tc>
+                  <a:txBody>
+                    <a:bodyPr/>
+                    <a:lstStyle/>
+                    <a:p>
+                      <a:r>
+                        <a:rPr lang="zh-TW" altLang="en-US" dirty="0" smtClean="0"/>
+                        <a:t>設定函式或物件時觸發</a:t>
+                      </a:r>
+                      <a:endParaRPr lang="zh-TW" altLang="en-US" dirty="0"/>
+                    </a:p>
+                  </a:txBody>
+                  <a:tcPr/>
+                </a:tc>
+                <a:extLst>
+                  <a:ext uri="{0D108BD9-81ED-4DB2-BD59-A6C34878D82A}">
+                    <a16:rowId xmlns:a16="http://schemas.microsoft.com/office/drawing/2014/main" val="1606050517"/>
+                  </a:ext>
+                </a:extLst>
+              </a:tr>
+            </a:tbl>
+          </a:graphicData>
+        </a:graphic>
+      </p:graphicFrame>
     </p:spTree>
     <p:extLst>
       <p:ext uri="{BB962C8B-B14F-4D97-AF65-F5344CB8AC3E}">
@@ -10666,33 +10404,550 @@
           </a:p>
         </p:txBody>
       </p:sp>
-      <p:sp>
-        <p:nvSpPr>
-          <p:cNvPr id="3" name="內容版面配置區 2"/>
-          <p:cNvSpPr>
-            <a:spLocks noGrp="1"/>
+      <p:pic>
+        <p:nvPicPr>
+          <p:cNvPr id="5" name="圖片 4"/>
+          <p:cNvPicPr>
+            <a:picLocks noChangeAspect="1"/>
+          </p:cNvPicPr>
+          <p:nvPr/>
+        </p:nvPicPr>
+        <p:blipFill>
+          <a:blip r:embed="rId2">
+            <a:extLst>
+              <a:ext uri="{28A0092B-C50C-407E-A947-70E740481C1C}">
+                <a14:useLocalDpi xmlns:a14="http://schemas.microsoft.com/office/drawing/2010/main" val="0"/>
+              </a:ext>
+            </a:extLst>
+          </a:blip>
+          <a:stretch>
+            <a:fillRect/>
+          </a:stretch>
+        </p:blipFill>
+        <p:spPr>
+          <a:xfrm>
+            <a:off x="6225280" y="1705706"/>
+            <a:ext cx="4123266" cy="3172656"/>
+          </a:xfrm>
+          <a:prstGeom prst="rect">
+            <a:avLst/>
+          </a:prstGeom>
+        </p:spPr>
+      </p:pic>
+      <p:sp>
+        <p:nvSpPr>
+          <p:cNvPr id="6" name="內容版面配置區 2"/>
+          <p:cNvSpPr txBox="1">
+            <a:spLocks/>
           </p:cNvSpPr>
-          <p:nvPr>
-            <p:ph idx="1"/>
-          </p:nvPr>
-        </p:nvSpPr>
-        <p:spPr/>
-        <p:txBody>
-          <a:bodyPr/>
-          <a:lstStyle/>
+          <p:nvPr/>
+        </p:nvSpPr>
+        <p:spPr>
+          <a:xfrm>
+            <a:off x="340989" y="1705706"/>
+            <a:ext cx="5249741" cy="2901463"/>
+          </a:xfrm>
+          <a:prstGeom prst="rect">
+            <a:avLst/>
+          </a:prstGeom>
+        </p:spPr>
+        <p:txBody>
+          <a:bodyPr vert="horz" lIns="91440" tIns="45720" rIns="91440" bIns="45720" rtlCol="0">
+            <a:normAutofit/>
+          </a:bodyPr>
+          <a:lstStyle>
+            <a:lvl1pPr marL="342900" indent="-342900" algn="l" defTabSz="457200" rtl="0" eaLnBrk="1" latinLnBrk="0" hangingPunct="1">
+              <a:spcBef>
+                <a:spcPts val="1000"/>
+              </a:spcBef>
+              <a:spcAft>
+                <a:spcPts val="0"/>
+              </a:spcAft>
+              <a:buClr>
+                <a:schemeClr val="accent1"/>
+              </a:buClr>
+              <a:buSzPct val="80000"/>
+              <a:buFont typeface="Wingdings 3" charset="2"/>
+              <a:buChar char=""/>
+              <a:defRPr sz="1800" kern="1200">
+                <a:solidFill>
+                  <a:schemeClr val="tx1">
+                    <a:lumMod val="75000"/>
+                    <a:lumOff val="25000"/>
+                  </a:schemeClr>
+                </a:solidFill>
+                <a:latin typeface="+mn-lt"/>
+                <a:ea typeface="+mn-ea"/>
+                <a:cs typeface="+mn-cs"/>
+              </a:defRPr>
+            </a:lvl1pPr>
+            <a:lvl2pPr marL="742950" indent="-285750" algn="l" defTabSz="457200" rtl="0" eaLnBrk="1" latinLnBrk="0" hangingPunct="1">
+              <a:spcBef>
+                <a:spcPts val="1000"/>
+              </a:spcBef>
+              <a:spcAft>
+                <a:spcPts val="0"/>
+              </a:spcAft>
+              <a:buClr>
+                <a:schemeClr val="accent1"/>
+              </a:buClr>
+              <a:buSzPct val="80000"/>
+              <a:buFont typeface="Wingdings 3" charset="2"/>
+              <a:buChar char=""/>
+              <a:defRPr sz="1600" kern="1200">
+                <a:solidFill>
+                  <a:schemeClr val="tx1">
+                    <a:lumMod val="75000"/>
+                    <a:lumOff val="25000"/>
+                  </a:schemeClr>
+                </a:solidFill>
+                <a:latin typeface="+mn-lt"/>
+                <a:ea typeface="+mn-ea"/>
+                <a:cs typeface="+mn-cs"/>
+              </a:defRPr>
+            </a:lvl2pPr>
+            <a:lvl3pPr marL="1143000" indent="-228600" algn="l" defTabSz="457200" rtl="0" eaLnBrk="1" latinLnBrk="0" hangingPunct="1">
+              <a:spcBef>
+                <a:spcPts val="1000"/>
+              </a:spcBef>
+              <a:spcAft>
+                <a:spcPts val="0"/>
+              </a:spcAft>
+              <a:buClr>
+                <a:schemeClr val="accent1"/>
+              </a:buClr>
+              <a:buSzPct val="80000"/>
+              <a:buFont typeface="Wingdings 3" charset="2"/>
+              <a:buChar char=""/>
+              <a:defRPr sz="1400" kern="1200">
+                <a:solidFill>
+                  <a:schemeClr val="tx1">
+                    <a:lumMod val="75000"/>
+                    <a:lumOff val="25000"/>
+                  </a:schemeClr>
+                </a:solidFill>
+                <a:latin typeface="+mn-lt"/>
+                <a:ea typeface="+mn-ea"/>
+                <a:cs typeface="+mn-cs"/>
+              </a:defRPr>
+            </a:lvl3pPr>
+            <a:lvl4pPr marL="1600200" indent="-228600" algn="l" defTabSz="457200" rtl="0" eaLnBrk="1" latinLnBrk="0" hangingPunct="1">
+              <a:spcBef>
+                <a:spcPts val="1000"/>
+              </a:spcBef>
+              <a:spcAft>
+                <a:spcPts val="0"/>
+              </a:spcAft>
+              <a:buClr>
+                <a:schemeClr val="accent1"/>
+              </a:buClr>
+              <a:buSzPct val="80000"/>
+              <a:buFont typeface="Wingdings 3" charset="2"/>
+              <a:buChar char=""/>
+              <a:defRPr sz="1200" kern="1200">
+                <a:solidFill>
+                  <a:schemeClr val="tx1">
+                    <a:lumMod val="75000"/>
+                    <a:lumOff val="25000"/>
+                  </a:schemeClr>
+                </a:solidFill>
+                <a:latin typeface="+mn-lt"/>
+                <a:ea typeface="+mn-ea"/>
+                <a:cs typeface="+mn-cs"/>
+              </a:defRPr>
+            </a:lvl4pPr>
+            <a:lvl5pPr marL="2057400" indent="-228600" algn="l" defTabSz="457200" rtl="0" eaLnBrk="1" latinLnBrk="0" hangingPunct="1">
+              <a:spcBef>
+                <a:spcPts val="1000"/>
+              </a:spcBef>
+              <a:spcAft>
+                <a:spcPts val="0"/>
+              </a:spcAft>
+              <a:buClr>
+                <a:schemeClr val="accent1"/>
+              </a:buClr>
+              <a:buSzPct val="80000"/>
+              <a:buFont typeface="Wingdings 3" charset="2"/>
+              <a:buChar char=""/>
+              <a:defRPr sz="1200" kern="1200">
+                <a:solidFill>
+                  <a:schemeClr val="tx1">
+                    <a:lumMod val="75000"/>
+                    <a:lumOff val="25000"/>
+                  </a:schemeClr>
+                </a:solidFill>
+                <a:latin typeface="+mn-lt"/>
+                <a:ea typeface="+mn-ea"/>
+                <a:cs typeface="+mn-cs"/>
+              </a:defRPr>
+            </a:lvl5pPr>
+            <a:lvl6pPr marL="2514600" indent="-228600" algn="l" defTabSz="457200" rtl="0" eaLnBrk="1" latinLnBrk="0" hangingPunct="1">
+              <a:spcBef>
+                <a:spcPts val="1000"/>
+              </a:spcBef>
+              <a:spcAft>
+                <a:spcPts val="0"/>
+              </a:spcAft>
+              <a:buClr>
+                <a:schemeClr val="accent1"/>
+              </a:buClr>
+              <a:buSzPct val="80000"/>
+              <a:buFont typeface="Wingdings 3" charset="2"/>
+              <a:buChar char=""/>
+              <a:defRPr sz="1200" kern="1200">
+                <a:solidFill>
+                  <a:schemeClr val="tx1">
+                    <a:lumMod val="75000"/>
+                    <a:lumOff val="25000"/>
+                  </a:schemeClr>
+                </a:solidFill>
+                <a:latin typeface="+mn-lt"/>
+                <a:ea typeface="+mn-ea"/>
+                <a:cs typeface="+mn-cs"/>
+              </a:defRPr>
+            </a:lvl6pPr>
+            <a:lvl7pPr marL="2971800" indent="-228600" algn="l" defTabSz="457200" rtl="0" eaLnBrk="1" latinLnBrk="0" hangingPunct="1">
+              <a:spcBef>
+                <a:spcPts val="1000"/>
+              </a:spcBef>
+              <a:spcAft>
+                <a:spcPts val="0"/>
+              </a:spcAft>
+              <a:buClr>
+                <a:schemeClr val="accent1"/>
+              </a:buClr>
+              <a:buSzPct val="80000"/>
+              <a:buFont typeface="Wingdings 3" charset="2"/>
+              <a:buChar char=""/>
+              <a:defRPr sz="1200" kern="1200">
+                <a:solidFill>
+                  <a:schemeClr val="tx1">
+                    <a:lumMod val="75000"/>
+                    <a:lumOff val="25000"/>
+                  </a:schemeClr>
+                </a:solidFill>
+                <a:latin typeface="+mn-lt"/>
+                <a:ea typeface="+mn-ea"/>
+                <a:cs typeface="+mn-cs"/>
+              </a:defRPr>
+            </a:lvl7pPr>
+            <a:lvl8pPr marL="3429000" indent="-228600" algn="l" defTabSz="457200" rtl="0" eaLnBrk="1" latinLnBrk="0" hangingPunct="1">
+              <a:spcBef>
+                <a:spcPts val="1000"/>
+              </a:spcBef>
+              <a:spcAft>
+                <a:spcPts val="0"/>
+              </a:spcAft>
+              <a:buClr>
+                <a:schemeClr val="accent1"/>
+              </a:buClr>
+              <a:buSzPct val="80000"/>
+              <a:buFont typeface="Wingdings 3" charset="2"/>
+              <a:buChar char=""/>
+              <a:defRPr sz="1200" kern="1200">
+                <a:solidFill>
+                  <a:schemeClr val="tx1">
+                    <a:lumMod val="75000"/>
+                    <a:lumOff val="25000"/>
+                  </a:schemeClr>
+                </a:solidFill>
+                <a:latin typeface="+mn-lt"/>
+                <a:ea typeface="+mn-ea"/>
+                <a:cs typeface="+mn-cs"/>
+              </a:defRPr>
+            </a:lvl8pPr>
+            <a:lvl9pPr marL="3886200" indent="-228600" algn="l" defTabSz="457200" rtl="0" eaLnBrk="1" latinLnBrk="0" hangingPunct="1">
+              <a:spcBef>
+                <a:spcPts val="1000"/>
+              </a:spcBef>
+              <a:spcAft>
+                <a:spcPts val="0"/>
+              </a:spcAft>
+              <a:buClr>
+                <a:schemeClr val="accent1"/>
+              </a:buClr>
+              <a:buSzPct val="80000"/>
+              <a:buFont typeface="Wingdings 3" charset="2"/>
+              <a:buChar char=""/>
+              <a:defRPr sz="1200" kern="1200">
+                <a:solidFill>
+                  <a:schemeClr val="tx1">
+                    <a:lumMod val="75000"/>
+                    <a:lumOff val="25000"/>
+                  </a:schemeClr>
+                </a:solidFill>
+                <a:latin typeface="+mn-lt"/>
+                <a:ea typeface="+mn-ea"/>
+                <a:cs typeface="+mn-cs"/>
+              </a:defRPr>
+            </a:lvl9pPr>
+          </a:lstStyle>
           <a:p>
             <a:r>
               <a:rPr lang="zh-TW" altLang="en-US" dirty="0" smtClean="0"/>
-              <a:t>語法</a:t>
-            </a:r>
-            <a:r>
-              <a:rPr lang="en-US" altLang="zh-TW" smtClean="0"/>
-              <a:t>:</a:t>
-            </a:r>
+              <a:t>監聽</a:t>
+            </a:r>
+            <a:r>
+              <a:rPr lang="en-US" altLang="zh-TW" dirty="0" smtClean="0"/>
+              <a:t>data</a:t>
+            </a:r>
+            <a:r>
+              <a:rPr lang="zh-TW" altLang="en-US" dirty="0" smtClean="0"/>
+              <a:t>中的變數，一旦變數發生改變就執行函式內的行為</a:t>
+            </a:r>
+            <a:endParaRPr lang="en-US" altLang="zh-TW" dirty="0" smtClean="0"/>
+          </a:p>
+          <a:p>
+            <a:r>
+              <a:rPr lang="en-US" altLang="zh-TW" dirty="0" smtClean="0"/>
+              <a:t>watch</a:t>
+            </a:r>
+            <a:r>
+              <a:rPr lang="zh-TW" altLang="en-US" dirty="0" smtClean="0"/>
+              <a:t>中的變數可以寫成函式或是物件</a:t>
+            </a:r>
+            <a:endParaRPr lang="en-US" altLang="zh-TW" dirty="0" smtClean="0"/>
+          </a:p>
+          <a:p>
+            <a:r>
+              <a:rPr lang="en-US" altLang="zh-TW" dirty="0" smtClean="0"/>
+              <a:t>watch</a:t>
+            </a:r>
+            <a:r>
+              <a:rPr lang="zh-TW" altLang="en-US" dirty="0" smtClean="0"/>
+              <a:t>的函式自帶</a:t>
+            </a:r>
+            <a:r>
+              <a:rPr lang="en-US" altLang="zh-TW" dirty="0" smtClean="0"/>
+              <a:t>2</a:t>
+            </a:r>
+            <a:r>
+              <a:rPr lang="zh-TW" altLang="en-US" dirty="0" smtClean="0"/>
+              <a:t>自訂義參數，一為新資料，一為上一個資料</a:t>
+            </a:r>
+            <a:endParaRPr lang="en-US" altLang="zh-TW" dirty="0"/>
+          </a:p>
+          <a:p>
+            <a:r>
+              <a:rPr lang="zh-TW" altLang="en-US" dirty="0" smtClean="0"/>
+              <a:t>若將變數宣告成物件，便會有</a:t>
+            </a:r>
+            <a:r>
+              <a:rPr lang="en-US" altLang="zh-TW" dirty="0" smtClean="0"/>
+              <a:t>immediate</a:t>
+            </a:r>
+            <a:r>
+              <a:rPr lang="zh-TW" altLang="en-US" dirty="0" smtClean="0"/>
+              <a:t>，</a:t>
+            </a:r>
+            <a:r>
+              <a:rPr lang="en-US" altLang="zh-TW" dirty="0" smtClean="0"/>
+              <a:t>deep</a:t>
+            </a:r>
+            <a:r>
+              <a:rPr lang="zh-TW" altLang="en-US" dirty="0"/>
+              <a:t>可</a:t>
+            </a:r>
+            <a:r>
+              <a:rPr lang="zh-TW" altLang="en-US" dirty="0" smtClean="0"/>
+              <a:t>使用</a:t>
+            </a:r>
+            <a:endParaRPr lang="en-US" altLang="zh-TW" dirty="0"/>
+          </a:p>
+          <a:p>
+            <a:r>
+              <a:rPr lang="en-US" altLang="zh-TW" dirty="0"/>
+              <a:t>h</a:t>
+            </a:r>
+            <a:r>
+              <a:rPr lang="en-US" altLang="zh-TW" dirty="0" smtClean="0"/>
+              <a:t>andler()</a:t>
+            </a:r>
+            <a:r>
+              <a:rPr lang="zh-TW" altLang="en-US" dirty="0" smtClean="0"/>
+              <a:t>與</a:t>
+            </a:r>
+            <a:r>
+              <a:rPr lang="en-US" altLang="zh-TW" dirty="0" smtClean="0"/>
+              <a:t>username()</a:t>
+            </a:r>
+            <a:r>
+              <a:rPr lang="zh-TW" altLang="en-US" dirty="0" smtClean="0"/>
+              <a:t>是一樣的</a:t>
+            </a:r>
+            <a:endParaRPr lang="en-US" altLang="zh-TW" dirty="0" smtClean="0"/>
+          </a:p>
+          <a:p>
+            <a:endParaRPr lang="en-US" altLang="zh-TW" dirty="0" smtClean="0"/>
+          </a:p>
+          <a:p>
+            <a:pPr marL="0" indent="0">
+              <a:buNone/>
+            </a:pPr>
+            <a:endParaRPr lang="en-US" altLang="zh-TW" dirty="0" smtClean="0"/>
+          </a:p>
+          <a:p>
             <a:endParaRPr lang="zh-TW" altLang="en-US" dirty="0"/>
           </a:p>
         </p:txBody>
       </p:sp>
+      <p:graphicFrame>
+        <p:nvGraphicFramePr>
+          <p:cNvPr id="9" name="表格 8"/>
+          <p:cNvGraphicFramePr>
+            <a:graphicFrameLocks noGrp="1"/>
+          </p:cNvGraphicFramePr>
+          <p:nvPr>
+            <p:extLst>
+              <p:ext uri="{D42A27DB-BD31-4B8C-83A1-F6EECF244321}">
+                <p14:modId xmlns:p14="http://schemas.microsoft.com/office/powerpoint/2010/main" val="1216305452"/>
+              </p:ext>
+            </p:extLst>
+          </p:nvPr>
+        </p:nvGraphicFramePr>
+        <p:xfrm>
+          <a:off x="448204" y="5149555"/>
+          <a:ext cx="9900342" cy="1107440"/>
+        </p:xfrm>
+        <a:graphic>
+          <a:graphicData uri="http://schemas.openxmlformats.org/drawingml/2006/table">
+            <a:tbl>
+              <a:tblPr firstRow="1" bandRow="1">
+                <a:tableStyleId>{5C22544A-7EE6-4342-B048-85BDC9FD1C3A}</a:tableStyleId>
+              </a:tblPr>
+              <a:tblGrid>
+                <a:gridCol w="4950171">
+                  <a:extLst>
+                    <a:ext uri="{9D8B030D-6E8A-4147-A177-3AD203B41FA5}">
+                      <a16:colId xmlns:a16="http://schemas.microsoft.com/office/drawing/2014/main" val="3340543633"/>
+                    </a:ext>
+                  </a:extLst>
+                </a:gridCol>
+                <a:gridCol w="4950171">
+                  <a:extLst>
+                    <a:ext uri="{9D8B030D-6E8A-4147-A177-3AD203B41FA5}">
+                      <a16:colId xmlns:a16="http://schemas.microsoft.com/office/drawing/2014/main" val="363185886"/>
+                    </a:ext>
+                  </a:extLst>
+                </a:gridCol>
+              </a:tblGrid>
+              <a:tr h="339382">
+                <a:tc>
+                  <a:txBody>
+                    <a:bodyPr/>
+                    <a:lstStyle/>
+                    <a:p>
+                      <a:r>
+                        <a:rPr lang="zh-TW" altLang="en-US" dirty="0" smtClean="0"/>
+                        <a:t>參數</a:t>
+                      </a:r>
+                      <a:endParaRPr lang="zh-TW" altLang="en-US" dirty="0"/>
+                    </a:p>
+                  </a:txBody>
+                  <a:tcPr/>
+                </a:tc>
+                <a:tc>
+                  <a:txBody>
+                    <a:bodyPr/>
+                    <a:lstStyle/>
+                    <a:p>
+                      <a:r>
+                        <a:rPr lang="zh-TW" altLang="en-US" dirty="0" smtClean="0"/>
+                        <a:t>說明</a:t>
+                      </a:r>
+                      <a:endParaRPr lang="zh-TW" altLang="en-US" dirty="0"/>
+                    </a:p>
+                  </a:txBody>
+                  <a:tcPr/>
+                </a:tc>
+                <a:extLst>
+                  <a:ext uri="{0D108BD9-81ED-4DB2-BD59-A6C34878D82A}">
+                    <a16:rowId xmlns:a16="http://schemas.microsoft.com/office/drawing/2014/main" val="2567284318"/>
+                  </a:ext>
+                </a:extLst>
+              </a:tr>
+              <a:tr h="370840">
+                <a:tc>
+                  <a:txBody>
+                    <a:bodyPr/>
+                    <a:lstStyle/>
+                    <a:p>
+                      <a:r>
+                        <a:rPr lang="en-US" altLang="zh-TW" dirty="0" smtClean="0"/>
+                        <a:t>Immediate</a:t>
+                      </a:r>
+                      <a:r>
+                        <a:rPr lang="zh-TW" altLang="en-US" dirty="0" smtClean="0"/>
+                        <a:t> </a:t>
+                      </a:r>
+                      <a:r>
+                        <a:rPr lang="en-US" altLang="zh-TW" dirty="0" smtClean="0"/>
+                        <a:t>(true or false)</a:t>
+                      </a:r>
+                      <a:endParaRPr lang="zh-TW" altLang="en-US" dirty="0"/>
+                    </a:p>
+                  </a:txBody>
+                  <a:tcPr/>
+                </a:tc>
+                <a:tc>
+                  <a:txBody>
+                    <a:bodyPr/>
+                    <a:lstStyle/>
+                    <a:p>
+                      <a:r>
+                        <a:rPr lang="zh-TW" altLang="en-US" dirty="0" smtClean="0"/>
+                        <a:t>資料初始化時便開始監聽</a:t>
+                      </a:r>
+                      <a:endParaRPr lang="zh-TW" altLang="en-US" dirty="0"/>
+                    </a:p>
+                  </a:txBody>
+                  <a:tcPr/>
+                </a:tc>
+                <a:extLst>
+                  <a:ext uri="{0D108BD9-81ED-4DB2-BD59-A6C34878D82A}">
+                    <a16:rowId xmlns:a16="http://schemas.microsoft.com/office/drawing/2014/main" val="3412253035"/>
+                  </a:ext>
+                </a:extLst>
+              </a:tr>
+              <a:tr h="370840">
+                <a:tc>
+                  <a:txBody>
+                    <a:bodyPr/>
+                    <a:lstStyle/>
+                    <a:p>
+                      <a:r>
+                        <a:rPr lang="en-US" altLang="zh-TW" dirty="0" smtClean="0"/>
+                        <a:t>deep(true or false)</a:t>
+                      </a:r>
+                      <a:endParaRPr lang="zh-TW" altLang="en-US" dirty="0"/>
+                    </a:p>
+                  </a:txBody>
+                  <a:tcPr/>
+                </a:tc>
+                <a:tc>
+                  <a:txBody>
+                    <a:bodyPr/>
+                    <a:lstStyle/>
+                    <a:p>
+                      <a:r>
+                        <a:rPr lang="zh-TW" altLang="en-US" dirty="0" smtClean="0"/>
+                        <a:t>針對物件做深度監聽</a:t>
+                      </a:r>
+                      <a:endParaRPr lang="zh-TW" altLang="en-US" dirty="0"/>
+                    </a:p>
+                  </a:txBody>
+                  <a:tcPr/>
+                </a:tc>
+                <a:extLst>
+                  <a:ext uri="{0D108BD9-81ED-4DB2-BD59-A6C34878D82A}">
+                    <a16:rowId xmlns:a16="http://schemas.microsoft.com/office/drawing/2014/main" val="2478135315"/>
+                  </a:ext>
+                </a:extLst>
+              </a:tr>
+            </a:tbl>
+          </a:graphicData>
+        </a:graphic>
+      </p:graphicFrame>
     </p:spTree>
     <p:extLst>
       <p:ext uri="{BB962C8B-B14F-4D97-AF65-F5344CB8AC3E}">

</xml_diff>